<commit_message>
Adding dapc call to ppt slide
</commit_message>
<xml_diff>
--- a/DAPC_Info_523_RPM_BJMM.pptx
+++ b/DAPC_Info_523_RPM_BJMM.pptx
@@ -12473,8 +12473,8 @@
         </p:nvSpPr>
         <p:spPr bwMode="auto">
           <a:xfrm rot="10800000" flipV="1">
-            <a:off x="2362200" y="2171700"/>
-            <a:ext cx="7391400" cy="6093976"/>
+            <a:off x="2345635" y="1866900"/>
+            <a:ext cx="7391400" cy="7201972"/>
           </a:xfrm>
           <a:prstGeom prst="rect">
             <a:avLst/>
@@ -12605,6 +12605,208 @@
               </a:rPr>
               <a:t>”</a:t>
             </a:r>
+          </a:p>
+          <a:p>
+            <a:pPr marL="0" marR="0" lvl="0" indent="0" algn="l" defTabSz="914400" rtl="0" eaLnBrk="0" fontAlgn="base" latinLnBrk="0" hangingPunct="0">
+              <a:lnSpc>
+                <a:spcPct val="100000"/>
+              </a:lnSpc>
+              <a:spcBef>
+                <a:spcPct val="0"/>
+              </a:spcBef>
+              <a:spcAft>
+                <a:spcPct val="0"/>
+              </a:spcAft>
+              <a:buClrTx/>
+              <a:buSzTx/>
+              <a:buFontTx/>
+              <a:buChar char="•"/>
+              <a:tabLst/>
+            </a:pPr>
+            <a:r>
+              <a:rPr kumimoji="0" lang="en-US" altLang="en-US" sz="2400" b="0" i="0" u="none" strike="noStrike" cap="none" normalizeH="0" baseline="0" dirty="0" err="1">
+                <a:ln>
+                  <a:noFill/>
+                </a:ln>
+                <a:solidFill>
+                  <a:schemeClr val="tx1"/>
+                </a:solidFill>
+                <a:effectLst/>
+                <a:latin typeface="Aptos" panose="020B0004020202020204" pitchFamily="34" charset="0"/>
+              </a:rPr>
+              <a:t>dapc_output</a:t>
+            </a:r>
+            <a:r>
+              <a:rPr kumimoji="0" lang="en-US" altLang="en-US" sz="2400" b="0" i="0" u="none" strike="noStrike" cap="none" normalizeH="0" baseline="0" dirty="0">
+                <a:ln>
+                  <a:noFill/>
+                </a:ln>
+                <a:solidFill>
+                  <a:schemeClr val="tx1"/>
+                </a:solidFill>
+                <a:effectLst/>
+                <a:latin typeface="Aptos" panose="020B0004020202020204" pitchFamily="34" charset="0"/>
+              </a:rPr>
+              <a:t> &lt;- </a:t>
+            </a:r>
+            <a:r>
+              <a:rPr kumimoji="0" lang="en-US" altLang="en-US" sz="2400" b="0" i="0" u="none" strike="noStrike" cap="none" normalizeH="0" baseline="0" dirty="0" err="1">
+                <a:ln>
+                  <a:noFill/>
+                </a:ln>
+                <a:solidFill>
+                  <a:schemeClr val="tx1"/>
+                </a:solidFill>
+                <a:effectLst/>
+                <a:latin typeface="Aptos" panose="020B0004020202020204" pitchFamily="34" charset="0"/>
+              </a:rPr>
+              <a:t>dapc</a:t>
+            </a:r>
+            <a:r>
+              <a:rPr kumimoji="0" lang="en-US" altLang="en-US" sz="2400" b="0" i="0" u="none" strike="noStrike" cap="none" normalizeH="0" baseline="0" dirty="0">
+                <a:ln>
+                  <a:noFill/>
+                </a:ln>
+                <a:solidFill>
+                  <a:schemeClr val="tx1"/>
+                </a:solidFill>
+                <a:effectLst/>
+                <a:latin typeface="Aptos" panose="020B0004020202020204" pitchFamily="34" charset="0"/>
+              </a:rPr>
+              <a:t>(</a:t>
+            </a:r>
+            <a:r>
+              <a:rPr kumimoji="0" lang="en-US" altLang="en-US" sz="2400" b="0" i="0" u="none" strike="noStrike" cap="none" normalizeH="0" baseline="0" dirty="0" err="1">
+                <a:ln>
+                  <a:noFill/>
+                </a:ln>
+                <a:solidFill>
+                  <a:schemeClr val="tx1"/>
+                </a:solidFill>
+                <a:effectLst/>
+                <a:latin typeface="Aptos" panose="020B0004020202020204" pitchFamily="34" charset="0"/>
+              </a:rPr>
+              <a:t>features_matrix_for_PCA</a:t>
+            </a:r>
+            <a:r>
+              <a:rPr kumimoji="0" lang="en-US" altLang="en-US" sz="2400" b="0" i="0" u="none" strike="noStrike" cap="none" normalizeH="0" baseline="0" dirty="0">
+                <a:ln>
+                  <a:noFill/>
+                </a:ln>
+                <a:solidFill>
+                  <a:schemeClr val="tx1"/>
+                </a:solidFill>
+                <a:effectLst/>
+                <a:latin typeface="Aptos" panose="020B0004020202020204" pitchFamily="34" charset="0"/>
+              </a:rPr>
+              <a:t>, </a:t>
+            </a:r>
+            <a:r>
+              <a:rPr kumimoji="0" lang="en-US" altLang="en-US" sz="2400" b="0" i="0" u="none" strike="noStrike" cap="none" normalizeH="0" baseline="0" dirty="0" err="1">
+                <a:ln>
+                  <a:noFill/>
+                </a:ln>
+                <a:solidFill>
+                  <a:schemeClr val="tx1"/>
+                </a:solidFill>
+                <a:effectLst/>
+                <a:latin typeface="Aptos" panose="020B0004020202020204" pitchFamily="34" charset="0"/>
+              </a:rPr>
+              <a:t>factors_for_DA</a:t>
+            </a:r>
+            <a:r>
+              <a:rPr kumimoji="0" lang="en-US" altLang="en-US" sz="2400" b="0" i="0" u="none" strike="noStrike" cap="none" normalizeH="0" baseline="0" dirty="0">
+                <a:ln>
+                  <a:noFill/>
+                </a:ln>
+                <a:solidFill>
+                  <a:schemeClr val="tx1"/>
+                </a:solidFill>
+                <a:effectLst/>
+                <a:latin typeface="Aptos" panose="020B0004020202020204" pitchFamily="34" charset="0"/>
+              </a:rPr>
+              <a:t>, </a:t>
+            </a:r>
+            <a:r>
+              <a:rPr kumimoji="0" lang="en-US" altLang="en-US" sz="2400" b="0" i="0" u="none" strike="noStrike" cap="none" normalizeH="0" baseline="0" dirty="0" err="1">
+                <a:ln>
+                  <a:noFill/>
+                </a:ln>
+                <a:solidFill>
+                  <a:schemeClr val="tx1"/>
+                </a:solidFill>
+                <a:effectLst/>
+                <a:latin typeface="Aptos" panose="020B0004020202020204" pitchFamily="34" charset="0"/>
+              </a:rPr>
+              <a:t>n.pca</a:t>
+            </a:r>
+            <a:r>
+              <a:rPr kumimoji="0" lang="en-US" altLang="en-US" sz="2400" b="0" i="0" u="none" strike="noStrike" cap="none" normalizeH="0" baseline="0" dirty="0">
+                <a:ln>
+                  <a:noFill/>
+                </a:ln>
+                <a:solidFill>
+                  <a:schemeClr val="tx1"/>
+                </a:solidFill>
+                <a:effectLst/>
+                <a:latin typeface="Aptos" panose="020B0004020202020204" pitchFamily="34" charset="0"/>
+              </a:rPr>
+              <a:t> = 3, </a:t>
+            </a:r>
+            <a:r>
+              <a:rPr kumimoji="0" lang="en-US" altLang="en-US" sz="2400" b="0" i="0" u="none" strike="noStrike" cap="none" normalizeH="0" baseline="0" dirty="0" err="1">
+                <a:ln>
+                  <a:noFill/>
+                </a:ln>
+                <a:solidFill>
+                  <a:schemeClr val="tx1"/>
+                </a:solidFill>
+                <a:effectLst/>
+                <a:latin typeface="Aptos" panose="020B0004020202020204" pitchFamily="34" charset="0"/>
+              </a:rPr>
+              <a:t>n.da</a:t>
+            </a:r>
+            <a:r>
+              <a:rPr kumimoji="0" lang="en-US" altLang="en-US" sz="2400" b="0" i="0" u="none" strike="noStrike" cap="none" normalizeH="0" baseline="0" dirty="0">
+                <a:ln>
+                  <a:noFill/>
+                </a:ln>
+                <a:solidFill>
+                  <a:schemeClr val="tx1"/>
+                </a:solidFill>
+                <a:effectLst/>
+                <a:latin typeface="Aptos" panose="020B0004020202020204" pitchFamily="34" charset="0"/>
+              </a:rPr>
+              <a:t> = 2)</a:t>
+            </a:r>
+          </a:p>
+          <a:p>
+            <a:pPr marL="0" marR="0" lvl="0" indent="0" algn="l" defTabSz="914400" rtl="0" eaLnBrk="0" fontAlgn="base" latinLnBrk="0" hangingPunct="0">
+              <a:lnSpc>
+                <a:spcPct val="100000"/>
+              </a:lnSpc>
+              <a:spcBef>
+                <a:spcPct val="0"/>
+              </a:spcBef>
+              <a:spcAft>
+                <a:spcPct val="0"/>
+              </a:spcAft>
+              <a:buClrTx/>
+              <a:buSzTx/>
+              <a:buFontTx/>
+              <a:buChar char="•"/>
+              <a:tabLst/>
+            </a:pPr>
+            <a:endParaRPr kumimoji="0" lang="en-US" altLang="en-US" sz="2400" b="0" i="0" u="none" strike="noStrike" cap="none" normalizeH="0" baseline="0" dirty="0">
+              <a:ln>
+                <a:noFill/>
+              </a:ln>
+              <a:solidFill>
+                <a:schemeClr val="tx1"/>
+              </a:solidFill>
+              <a:effectLst/>
+              <a:latin typeface="Aptos" panose="020B0004020202020204" pitchFamily="34" charset="0"/>
+            </a:endParaRPr>
           </a:p>
           <a:p>
             <a:pPr marL="0" marR="0" lvl="0" indent="0" algn="l" defTabSz="914400" rtl="0" eaLnBrk="0" fontAlgn="base" latinLnBrk="0" hangingPunct="0">

</xml_diff>